<commit_message>
Attitude to defect for programmers
</commit_message>
<xml_diff>
--- a/memo/diagrams.pptx
+++ b/memo/diagrams.pptx
@@ -289,7 +289,7 @@
           <a:p>
             <a:fld id="{E90ED720-0104-4369-84BC-D37694168613}" type="datetimeFigureOut">
               <a:rPr kumimoji="1" lang="ja-JP" altLang="en-US" smtClean="0"/>
-              <a:t>2015/9/24</a:t>
+              <a:t>2016/7/28</a:t>
             </a:fld>
             <a:endParaRPr kumimoji="1" lang="ja-JP" altLang="en-US"/>
           </a:p>
@@ -486,7 +486,7 @@
           <a:p>
             <a:fld id="{E90ED720-0104-4369-84BC-D37694168613}" type="datetimeFigureOut">
               <a:rPr kumimoji="1" lang="ja-JP" altLang="en-US" smtClean="0"/>
-              <a:t>2015/9/24</a:t>
+              <a:t>2016/7/28</a:t>
             </a:fld>
             <a:endParaRPr kumimoji="1" lang="ja-JP" altLang="en-US"/>
           </a:p>
@@ -693,7 +693,7 @@
           <a:p>
             <a:fld id="{E90ED720-0104-4369-84BC-D37694168613}" type="datetimeFigureOut">
               <a:rPr kumimoji="1" lang="ja-JP" altLang="en-US" smtClean="0"/>
-              <a:t>2015/9/24</a:t>
+              <a:t>2016/7/28</a:t>
             </a:fld>
             <a:endParaRPr kumimoji="1" lang="ja-JP" altLang="en-US"/>
           </a:p>
@@ -890,7 +890,7 @@
           <a:p>
             <a:fld id="{E90ED720-0104-4369-84BC-D37694168613}" type="datetimeFigureOut">
               <a:rPr kumimoji="1" lang="ja-JP" altLang="en-US" smtClean="0"/>
-              <a:t>2015/9/24</a:t>
+              <a:t>2016/7/28</a:t>
             </a:fld>
             <a:endParaRPr kumimoji="1" lang="ja-JP" altLang="en-US"/>
           </a:p>
@@ -1131,7 +1131,7 @@
           <a:p>
             <a:fld id="{E90ED720-0104-4369-84BC-D37694168613}" type="datetimeFigureOut">
               <a:rPr kumimoji="1" lang="ja-JP" altLang="en-US" smtClean="0"/>
-              <a:t>2015/9/24</a:t>
+              <a:t>2016/7/28</a:t>
             </a:fld>
             <a:endParaRPr kumimoji="1" lang="ja-JP" altLang="en-US"/>
           </a:p>
@@ -1478,7 +1478,7 @@
           <a:p>
             <a:fld id="{E90ED720-0104-4369-84BC-D37694168613}" type="datetimeFigureOut">
               <a:rPr kumimoji="1" lang="ja-JP" altLang="en-US" smtClean="0"/>
-              <a:t>2015/9/24</a:t>
+              <a:t>2016/7/28</a:t>
             </a:fld>
             <a:endParaRPr kumimoji="1" lang="ja-JP" altLang="en-US"/>
           </a:p>
@@ -1959,7 +1959,7 @@
           <a:p>
             <a:fld id="{E90ED720-0104-4369-84BC-D37694168613}" type="datetimeFigureOut">
               <a:rPr kumimoji="1" lang="ja-JP" altLang="en-US" smtClean="0"/>
-              <a:t>2015/9/24</a:t>
+              <a:t>2016/7/28</a:t>
             </a:fld>
             <a:endParaRPr kumimoji="1" lang="ja-JP" altLang="en-US"/>
           </a:p>
@@ -2072,7 +2072,7 @@
           <a:p>
             <a:fld id="{E90ED720-0104-4369-84BC-D37694168613}" type="datetimeFigureOut">
               <a:rPr kumimoji="1" lang="ja-JP" altLang="en-US" smtClean="0"/>
-              <a:t>2015/9/24</a:t>
+              <a:t>2016/7/28</a:t>
             </a:fld>
             <a:endParaRPr kumimoji="1" lang="ja-JP" altLang="en-US"/>
           </a:p>
@@ -2162,7 +2162,7 @@
           <a:p>
             <a:fld id="{E90ED720-0104-4369-84BC-D37694168613}" type="datetimeFigureOut">
               <a:rPr kumimoji="1" lang="ja-JP" altLang="en-US" smtClean="0"/>
-              <a:t>2015/9/24</a:t>
+              <a:t>2016/7/28</a:t>
             </a:fld>
             <a:endParaRPr kumimoji="1" lang="ja-JP" altLang="en-US"/>
           </a:p>
@@ -2466,7 +2466,7 @@
           <a:p>
             <a:fld id="{E90ED720-0104-4369-84BC-D37694168613}" type="datetimeFigureOut">
               <a:rPr kumimoji="1" lang="ja-JP" altLang="en-US" smtClean="0"/>
-              <a:t>2015/9/24</a:t>
+              <a:t>2016/7/28</a:t>
             </a:fld>
             <a:endParaRPr kumimoji="1" lang="ja-JP" altLang="en-US"/>
           </a:p>
@@ -2714,7 +2714,7 @@
           <a:p>
             <a:fld id="{E90ED720-0104-4369-84BC-D37694168613}" type="datetimeFigureOut">
               <a:rPr kumimoji="1" lang="ja-JP" altLang="en-US" smtClean="0"/>
-              <a:t>2015/9/24</a:t>
+              <a:t>2016/7/28</a:t>
             </a:fld>
             <a:endParaRPr kumimoji="1" lang="ja-JP" altLang="en-US"/>
           </a:p>
@@ -2954,7 +2954,7 @@
           <a:p>
             <a:fld id="{E90ED720-0104-4369-84BC-D37694168613}" type="datetimeFigureOut">
               <a:rPr kumimoji="1" lang="ja-JP" altLang="en-US" smtClean="0"/>
-              <a:t>2015/9/24</a:t>
+              <a:t>2016/7/28</a:t>
             </a:fld>
             <a:endParaRPr kumimoji="1" lang="ja-JP" altLang="en-US"/>
           </a:p>
@@ -3340,10 +3340,554 @@
           <a:lstStyle/>
           <a:p>
             <a:r>
-              <a:rPr lang="en-US" altLang="ja-JP" dirty="0" smtClean="0"/>
-              <a:t>test-pyramid</a:t>
+              <a:rPr kumimoji="1" lang="en-US" altLang="ja-JP" dirty="0" smtClean="0"/>
+              <a:t>remove-error-prone-code</a:t>
             </a:r>
             <a:endParaRPr kumimoji="1" lang="ja-JP" altLang="en-US" dirty="0"/>
+          </a:p>
+        </p:txBody>
+      </p:sp>
+      <p:sp>
+        <p:nvSpPr>
+          <p:cNvPr id="2" name="角丸四角形 1"/>
+          <p:cNvSpPr/>
+          <p:nvPr/>
+        </p:nvSpPr>
+        <p:spPr>
+          <a:xfrm>
+            <a:off x="1942833" y="1361159"/>
+            <a:ext cx="1909087" cy="981023"/>
+          </a:xfrm>
+          <a:prstGeom prst="roundRect">
+            <a:avLst/>
+          </a:prstGeom>
+          <a:solidFill>
+            <a:schemeClr val="tx1">
+              <a:lumMod val="50000"/>
+              <a:lumOff val="50000"/>
+            </a:schemeClr>
+          </a:solidFill>
+          <a:ln>
+            <a:noFill/>
+          </a:ln>
+        </p:spPr>
+        <p:style>
+          <a:lnRef idx="2">
+            <a:schemeClr val="accent1">
+              <a:shade val="50000"/>
+            </a:schemeClr>
+          </a:lnRef>
+          <a:fillRef idx="1">
+            <a:schemeClr val="accent1"/>
+          </a:fillRef>
+          <a:effectRef idx="0">
+            <a:schemeClr val="accent1"/>
+          </a:effectRef>
+          <a:fontRef idx="minor">
+            <a:schemeClr val="lt1"/>
+          </a:fontRef>
+        </p:style>
+        <p:txBody>
+          <a:bodyPr rtlCol="0" anchor="ctr"/>
+          <a:lstStyle/>
+          <a:p>
+            <a:pPr algn="ctr"/>
+            <a:r>
+              <a:rPr lang="ja-JP" altLang="en-US" sz="1200" dirty="0"/>
+              <a:t>不具合</a:t>
+            </a:r>
+            <a:r>
+              <a:rPr lang="ja-JP" altLang="en-US" sz="1200" dirty="0" smtClean="0"/>
+              <a:t>の入りやすい</a:t>
+            </a:r>
+            <a:endParaRPr lang="en-US" altLang="ja-JP" sz="1200" dirty="0" smtClean="0"/>
+          </a:p>
+          <a:p>
+            <a:pPr algn="ctr"/>
+            <a:r>
+              <a:rPr lang="ja-JP" altLang="en-US" sz="1200" dirty="0">
+                <a:latin typeface="Meiryo UI" pitchFamily="50" charset="-128"/>
+                <a:ea typeface="Meiryo UI" pitchFamily="50" charset="-128"/>
+                <a:cs typeface="Meiryo UI" pitchFamily="50" charset="-128"/>
+              </a:rPr>
+              <a:t>「仕様書</a:t>
+            </a:r>
+            <a:r>
+              <a:rPr lang="ja-JP" altLang="en-US" sz="1200" dirty="0" smtClean="0">
+                <a:latin typeface="Meiryo UI" pitchFamily="50" charset="-128"/>
+                <a:ea typeface="Meiryo UI" pitchFamily="50" charset="-128"/>
+                <a:cs typeface="Meiryo UI" pitchFamily="50" charset="-128"/>
+              </a:rPr>
+              <a:t>」</a:t>
+            </a:r>
+            <a:r>
+              <a:rPr kumimoji="1" lang="en-US" altLang="ja-JP" sz="1200" dirty="0" smtClean="0">
+                <a:latin typeface="Meiryo UI" pitchFamily="50" charset="-128"/>
+                <a:ea typeface="Meiryo UI" pitchFamily="50" charset="-128"/>
+                <a:cs typeface="Meiryo UI" pitchFamily="50" charset="-128"/>
+              </a:rPr>
+              <a:t/>
+            </a:r>
+            <a:br>
+              <a:rPr kumimoji="1" lang="en-US" altLang="ja-JP" sz="1200" dirty="0" smtClean="0">
+                <a:latin typeface="Meiryo UI" pitchFamily="50" charset="-128"/>
+                <a:ea typeface="Meiryo UI" pitchFamily="50" charset="-128"/>
+                <a:cs typeface="Meiryo UI" pitchFamily="50" charset="-128"/>
+              </a:rPr>
+            </a:br>
+            <a:r>
+              <a:rPr kumimoji="1" lang="ja-JP" altLang="en-US" sz="1200" dirty="0" smtClean="0">
+                <a:latin typeface="Meiryo UI" pitchFamily="50" charset="-128"/>
+                <a:ea typeface="Meiryo UI" pitchFamily="50" charset="-128"/>
+                <a:cs typeface="Meiryo UI" pitchFamily="50" charset="-128"/>
+              </a:rPr>
+              <a:t>「プロセス」</a:t>
+            </a:r>
+            <a:r>
+              <a:rPr kumimoji="1" lang="en-US" altLang="ja-JP" sz="1200" dirty="0" smtClean="0">
+                <a:latin typeface="Meiryo UI" pitchFamily="50" charset="-128"/>
+                <a:ea typeface="Meiryo UI" pitchFamily="50" charset="-128"/>
+                <a:cs typeface="Meiryo UI" pitchFamily="50" charset="-128"/>
+              </a:rPr>
+              <a:t/>
+            </a:r>
+            <a:br>
+              <a:rPr kumimoji="1" lang="en-US" altLang="ja-JP" sz="1200" dirty="0" smtClean="0">
+                <a:latin typeface="Meiryo UI" pitchFamily="50" charset="-128"/>
+                <a:ea typeface="Meiryo UI" pitchFamily="50" charset="-128"/>
+                <a:cs typeface="Meiryo UI" pitchFamily="50" charset="-128"/>
+              </a:rPr>
+            </a:br>
+            <a:r>
+              <a:rPr lang="ja-JP" altLang="en-US" sz="1200" dirty="0">
+                <a:latin typeface="Meiryo UI" pitchFamily="50" charset="-128"/>
+                <a:ea typeface="Meiryo UI" pitchFamily="50" charset="-128"/>
+                <a:cs typeface="Meiryo UI" pitchFamily="50" charset="-128"/>
+              </a:rPr>
+              <a:t>「設計」</a:t>
+            </a:r>
+            <a:endParaRPr kumimoji="1" lang="ja-JP" altLang="en-US" sz="1200" dirty="0">
+              <a:latin typeface="Meiryo UI" pitchFamily="50" charset="-128"/>
+              <a:ea typeface="Meiryo UI" pitchFamily="50" charset="-128"/>
+              <a:cs typeface="Meiryo UI" pitchFamily="50" charset="-128"/>
+            </a:endParaRPr>
+          </a:p>
+        </p:txBody>
+      </p:sp>
+      <p:sp>
+        <p:nvSpPr>
+          <p:cNvPr id="5" name="角丸四角形 4"/>
+          <p:cNvSpPr/>
+          <p:nvPr/>
+        </p:nvSpPr>
+        <p:spPr>
+          <a:xfrm>
+            <a:off x="4691204" y="1317084"/>
+            <a:ext cx="943915" cy="303392"/>
+          </a:xfrm>
+          <a:prstGeom prst="roundRect">
+            <a:avLst/>
+          </a:prstGeom>
+          <a:solidFill>
+            <a:schemeClr val="tx1">
+              <a:lumMod val="50000"/>
+              <a:lumOff val="50000"/>
+            </a:schemeClr>
+          </a:solidFill>
+          <a:ln>
+            <a:noFill/>
+          </a:ln>
+        </p:spPr>
+        <p:style>
+          <a:lnRef idx="2">
+            <a:schemeClr val="accent1">
+              <a:shade val="50000"/>
+            </a:schemeClr>
+          </a:lnRef>
+          <a:fillRef idx="1">
+            <a:schemeClr val="accent1"/>
+          </a:fillRef>
+          <a:effectRef idx="0">
+            <a:schemeClr val="accent1"/>
+          </a:effectRef>
+          <a:fontRef idx="minor">
+            <a:schemeClr val="lt1"/>
+          </a:fontRef>
+        </p:style>
+        <p:txBody>
+          <a:bodyPr rtlCol="0" anchor="ctr"/>
+          <a:lstStyle/>
+          <a:p>
+            <a:pPr algn="ctr"/>
+            <a:r>
+              <a:rPr lang="ja-JP" altLang="en-US" sz="1200" dirty="0"/>
+              <a:t>不具合</a:t>
+            </a:r>
+            <a:endParaRPr lang="en-US" altLang="ja-JP" sz="1200" dirty="0" smtClean="0"/>
+          </a:p>
+        </p:txBody>
+      </p:sp>
+      <p:cxnSp>
+        <p:nvCxnSpPr>
+          <p:cNvPr id="6" name="直線矢印コネクタ 5"/>
+          <p:cNvCxnSpPr>
+            <a:stCxn id="2" idx="3"/>
+            <a:endCxn id="5" idx="1"/>
+          </p:cNvCxnSpPr>
+          <p:nvPr/>
+        </p:nvCxnSpPr>
+        <p:spPr>
+          <a:xfrm flipV="1">
+            <a:off x="3851920" y="1468780"/>
+            <a:ext cx="839284" cy="382891"/>
+          </a:xfrm>
+          <a:prstGeom prst="straightConnector1">
+            <a:avLst/>
+          </a:prstGeom>
+          <a:ln w="38100">
+            <a:solidFill>
+              <a:schemeClr val="tx1">
+                <a:lumMod val="50000"/>
+                <a:lumOff val="50000"/>
+              </a:schemeClr>
+            </a:solidFill>
+            <a:tailEnd type="arrow"/>
+          </a:ln>
+        </p:spPr>
+        <p:style>
+          <a:lnRef idx="1">
+            <a:schemeClr val="accent1"/>
+          </a:lnRef>
+          <a:fillRef idx="0">
+            <a:schemeClr val="accent1"/>
+          </a:fillRef>
+          <a:effectRef idx="0">
+            <a:schemeClr val="accent1"/>
+          </a:effectRef>
+          <a:fontRef idx="minor">
+            <a:schemeClr val="tx1"/>
+          </a:fontRef>
+        </p:style>
+      </p:cxnSp>
+      <p:sp>
+        <p:nvSpPr>
+          <p:cNvPr id="8" name="角丸四角形 7"/>
+          <p:cNvSpPr/>
+          <p:nvPr/>
+        </p:nvSpPr>
+        <p:spPr>
+          <a:xfrm>
+            <a:off x="4691204" y="1699974"/>
+            <a:ext cx="943915" cy="303392"/>
+          </a:xfrm>
+          <a:prstGeom prst="roundRect">
+            <a:avLst/>
+          </a:prstGeom>
+          <a:solidFill>
+            <a:schemeClr val="tx1">
+              <a:lumMod val="50000"/>
+              <a:lumOff val="50000"/>
+            </a:schemeClr>
+          </a:solidFill>
+          <a:ln>
+            <a:noFill/>
+          </a:ln>
+        </p:spPr>
+        <p:style>
+          <a:lnRef idx="2">
+            <a:schemeClr val="accent1">
+              <a:shade val="50000"/>
+            </a:schemeClr>
+          </a:lnRef>
+          <a:fillRef idx="1">
+            <a:schemeClr val="accent1"/>
+          </a:fillRef>
+          <a:effectRef idx="0">
+            <a:schemeClr val="accent1"/>
+          </a:effectRef>
+          <a:fontRef idx="minor">
+            <a:schemeClr val="lt1"/>
+          </a:fontRef>
+        </p:style>
+        <p:txBody>
+          <a:bodyPr rtlCol="0" anchor="ctr"/>
+          <a:lstStyle/>
+          <a:p>
+            <a:pPr algn="ctr"/>
+            <a:r>
+              <a:rPr lang="ja-JP" altLang="en-US" sz="1200" dirty="0"/>
+              <a:t>不具合</a:t>
+            </a:r>
+            <a:endParaRPr lang="en-US" altLang="ja-JP" sz="1200" dirty="0" smtClean="0"/>
+          </a:p>
+        </p:txBody>
+      </p:sp>
+      <p:sp>
+        <p:nvSpPr>
+          <p:cNvPr id="9" name="角丸四角形 8"/>
+          <p:cNvSpPr/>
+          <p:nvPr/>
+        </p:nvSpPr>
+        <p:spPr>
+          <a:xfrm>
+            <a:off x="4691204" y="2082863"/>
+            <a:ext cx="943915" cy="303392"/>
+          </a:xfrm>
+          <a:prstGeom prst="roundRect">
+            <a:avLst/>
+          </a:prstGeom>
+          <a:solidFill>
+            <a:schemeClr val="tx1">
+              <a:lumMod val="50000"/>
+              <a:lumOff val="50000"/>
+            </a:schemeClr>
+          </a:solidFill>
+          <a:ln>
+            <a:noFill/>
+          </a:ln>
+        </p:spPr>
+        <p:style>
+          <a:lnRef idx="2">
+            <a:schemeClr val="accent1">
+              <a:shade val="50000"/>
+            </a:schemeClr>
+          </a:lnRef>
+          <a:fillRef idx="1">
+            <a:schemeClr val="accent1"/>
+          </a:fillRef>
+          <a:effectRef idx="0">
+            <a:schemeClr val="accent1"/>
+          </a:effectRef>
+          <a:fontRef idx="minor">
+            <a:schemeClr val="lt1"/>
+          </a:fontRef>
+        </p:style>
+        <p:txBody>
+          <a:bodyPr rtlCol="0" anchor="ctr"/>
+          <a:lstStyle/>
+          <a:p>
+            <a:pPr algn="ctr"/>
+            <a:r>
+              <a:rPr lang="ja-JP" altLang="en-US" sz="1200" dirty="0"/>
+              <a:t>不具合</a:t>
+            </a:r>
+            <a:endParaRPr lang="en-US" altLang="ja-JP" sz="1200" dirty="0" smtClean="0"/>
+          </a:p>
+        </p:txBody>
+      </p:sp>
+      <p:cxnSp>
+        <p:nvCxnSpPr>
+          <p:cNvPr id="10" name="直線矢印コネクタ 9"/>
+          <p:cNvCxnSpPr>
+            <a:stCxn id="2" idx="3"/>
+            <a:endCxn id="8" idx="1"/>
+          </p:cNvCxnSpPr>
+          <p:nvPr/>
+        </p:nvCxnSpPr>
+        <p:spPr>
+          <a:xfrm flipV="1">
+            <a:off x="3851920" y="1851670"/>
+            <a:ext cx="839284" cy="1"/>
+          </a:xfrm>
+          <a:prstGeom prst="straightConnector1">
+            <a:avLst/>
+          </a:prstGeom>
+          <a:ln w="38100">
+            <a:solidFill>
+              <a:schemeClr val="tx1">
+                <a:lumMod val="50000"/>
+                <a:lumOff val="50000"/>
+              </a:schemeClr>
+            </a:solidFill>
+            <a:tailEnd type="arrow"/>
+          </a:ln>
+        </p:spPr>
+        <p:style>
+          <a:lnRef idx="1">
+            <a:schemeClr val="accent1"/>
+          </a:lnRef>
+          <a:fillRef idx="0">
+            <a:schemeClr val="accent1"/>
+          </a:fillRef>
+          <a:effectRef idx="0">
+            <a:schemeClr val="accent1"/>
+          </a:effectRef>
+          <a:fontRef idx="minor">
+            <a:schemeClr val="tx1"/>
+          </a:fontRef>
+        </p:style>
+      </p:cxnSp>
+      <p:cxnSp>
+        <p:nvCxnSpPr>
+          <p:cNvPr id="13" name="直線矢印コネクタ 12"/>
+          <p:cNvCxnSpPr>
+            <a:stCxn id="2" idx="3"/>
+            <a:endCxn id="9" idx="1"/>
+          </p:cNvCxnSpPr>
+          <p:nvPr/>
+        </p:nvCxnSpPr>
+        <p:spPr>
+          <a:xfrm>
+            <a:off x="3851920" y="1851671"/>
+            <a:ext cx="839284" cy="382888"/>
+          </a:xfrm>
+          <a:prstGeom prst="straightConnector1">
+            <a:avLst/>
+          </a:prstGeom>
+          <a:ln w="38100">
+            <a:solidFill>
+              <a:schemeClr val="tx1">
+                <a:lumMod val="50000"/>
+                <a:lumOff val="50000"/>
+              </a:schemeClr>
+            </a:solidFill>
+            <a:tailEnd type="arrow"/>
+          </a:ln>
+        </p:spPr>
+        <p:style>
+          <a:lnRef idx="1">
+            <a:schemeClr val="accent1"/>
+          </a:lnRef>
+          <a:fillRef idx="0">
+            <a:schemeClr val="accent1"/>
+          </a:fillRef>
+          <a:effectRef idx="0">
+            <a:schemeClr val="accent1"/>
+          </a:effectRef>
+          <a:fontRef idx="minor">
+            <a:schemeClr val="tx1"/>
+          </a:fontRef>
+        </p:style>
+      </p:cxnSp>
+      <p:sp>
+        <p:nvSpPr>
+          <p:cNvPr id="17" name="テキスト ボックス 16"/>
+          <p:cNvSpPr txBox="1"/>
+          <p:nvPr/>
+        </p:nvSpPr>
+        <p:spPr>
+          <a:xfrm>
+            <a:off x="1742378" y="2386255"/>
+            <a:ext cx="2309996" cy="461665"/>
+          </a:xfrm>
+          <a:prstGeom prst="rect">
+            <a:avLst/>
+          </a:prstGeom>
+          <a:noFill/>
+        </p:spPr>
+        <p:txBody>
+          <a:bodyPr wrap="square" rtlCol="0">
+            <a:spAutoFit/>
+          </a:bodyPr>
+          <a:lstStyle/>
+          <a:p>
+            <a:pPr algn="ctr"/>
+            <a:r>
+              <a:rPr kumimoji="1" lang="ja-JP" altLang="en-US" sz="1200" b="1" dirty="0" smtClean="0">
+                <a:solidFill>
+                  <a:srgbClr val="FF3399"/>
+                </a:solidFill>
+              </a:rPr>
+              <a:t>こっちの根本的な</a:t>
+            </a:r>
+            <a:r>
+              <a:rPr kumimoji="1" lang="en-US" altLang="ja-JP" sz="1200" b="1" dirty="0" smtClean="0">
+                <a:solidFill>
+                  <a:srgbClr val="FF3399"/>
+                </a:solidFill>
+              </a:rPr>
+              <a:t/>
+            </a:r>
+            <a:br>
+              <a:rPr kumimoji="1" lang="en-US" altLang="ja-JP" sz="1200" b="1" dirty="0" smtClean="0">
+                <a:solidFill>
+                  <a:srgbClr val="FF3399"/>
+                </a:solidFill>
+              </a:rPr>
+            </a:br>
+            <a:r>
+              <a:rPr kumimoji="1" lang="ja-JP" altLang="en-US" sz="1200" b="1" dirty="0" smtClean="0">
+                <a:solidFill>
+                  <a:srgbClr val="FF3399"/>
+                </a:solidFill>
+              </a:rPr>
+              <a:t>原因を修正しなければ・・・</a:t>
+            </a:r>
+            <a:endParaRPr kumimoji="1" lang="ja-JP" altLang="en-US" sz="1400" b="1" dirty="0">
+              <a:solidFill>
+                <a:srgbClr val="FF3399"/>
+              </a:solidFill>
+            </a:endParaRPr>
+          </a:p>
+        </p:txBody>
+      </p:sp>
+      <p:sp>
+        <p:nvSpPr>
+          <p:cNvPr id="18" name="テキスト ボックス 17"/>
+          <p:cNvSpPr txBox="1"/>
+          <p:nvPr/>
+        </p:nvSpPr>
+        <p:spPr>
+          <a:xfrm>
+            <a:off x="4031065" y="2386206"/>
+            <a:ext cx="2341136" cy="461665"/>
+          </a:xfrm>
+          <a:prstGeom prst="rect">
+            <a:avLst/>
+          </a:prstGeom>
+          <a:noFill/>
+        </p:spPr>
+        <p:txBody>
+          <a:bodyPr wrap="square" rtlCol="0">
+            <a:spAutoFit/>
+          </a:bodyPr>
+          <a:lstStyle/>
+          <a:p>
+            <a:pPr algn="ctr"/>
+            <a:r>
+              <a:rPr lang="ja-JP" altLang="en-US" sz="1200" b="1" dirty="0">
+                <a:solidFill>
+                  <a:srgbClr val="FF3399"/>
+                </a:solidFill>
+              </a:rPr>
+              <a:t>不具合</a:t>
+            </a:r>
+            <a:r>
+              <a:rPr lang="ja-JP" altLang="en-US" sz="1200" b="1" dirty="0" smtClean="0">
+                <a:solidFill>
+                  <a:srgbClr val="FF3399"/>
+                </a:solidFill>
+              </a:rPr>
+              <a:t>をいくら直しても</a:t>
+            </a:r>
+            <a:r>
+              <a:rPr lang="en-US" altLang="ja-JP" sz="1200" b="1" dirty="0" smtClean="0">
+                <a:solidFill>
+                  <a:srgbClr val="FF3399"/>
+                </a:solidFill>
+              </a:rPr>
+              <a:t/>
+            </a:r>
+            <a:br>
+              <a:rPr lang="en-US" altLang="ja-JP" sz="1200" b="1" dirty="0" smtClean="0">
+                <a:solidFill>
+                  <a:srgbClr val="FF3399"/>
+                </a:solidFill>
+              </a:rPr>
+            </a:br>
+            <a:r>
+              <a:rPr lang="ja-JP" altLang="en-US" sz="1200" b="1" dirty="0" smtClean="0">
+                <a:solidFill>
+                  <a:srgbClr val="FF3399"/>
+                </a:solidFill>
+              </a:rPr>
+              <a:t>量産され続ける</a:t>
+            </a:r>
+            <a:endParaRPr kumimoji="1" lang="ja-JP" altLang="en-US" sz="1200" b="1" dirty="0">
+              <a:solidFill>
+                <a:srgbClr val="FF3399"/>
+              </a:solidFill>
+            </a:endParaRPr>
           </a:p>
         </p:txBody>
       </p:sp>

</xml_diff>